<commit_message>
Approx execution time q2
</commit_message>
<xml_diff>
--- a/Poster/BDM_poster_newest.pptx
+++ b/Poster/BDM_poster_newest.pptx
@@ -7532,7 +7532,14 @@
                 <a:latin typeface="Arial" panose="020B0604020202020204" pitchFamily="34" charset="0"/>
                 <a:ea typeface="Calibri" panose="020F0502020204030204" pitchFamily="34" charset="0"/>
               </a:rPr>
-              <a:t>t optimization techniques have been applied to the Python version like indexing, repartition and storing in temporary view.</a:t>
+              <a:t>t optimization techniques have been applied to the Python version like indexing, repartition and storing in temporary view. The execution time for </a:t>
+            </a:r>
+            <a:r>
+              <a:rPr lang="en-GB" sz="2400">
+                <a:latin typeface="Arial" panose="020B0604020202020204" pitchFamily="34" charset="0"/>
+                <a:ea typeface="Calibri" panose="020F0502020204030204" pitchFamily="34" charset="0"/>
+              </a:rPr>
+              <a:t>the cluster is 1766 seconds.</a:t>
             </a:r>
             <a:endParaRPr lang="en-NL" sz="2400" dirty="0">
               <a:effectLst/>

</xml_diff>

<commit_message>
Updated Q4 and executions times added
</commit_message>
<xml_diff>
--- a/Poster/BDM_poster_newest.pptx
+++ b/Poster/BDM_poster_newest.pptx
@@ -466,7 +466,7 @@
               <a:pPr>
                 <a:defRPr/>
               </a:pPr>
-              <a:t>‹nr.›</a:t>
+              <a:t>‹#›</a:t>
             </a:fld>
             <a:endParaRPr lang="nl-NL"/>
           </a:p>
@@ -7628,6 +7628,23 @@
                 <a:ea typeface="Calibri" panose="020F0502020204030204" pitchFamily="34" charset="0"/>
               </a:rPr>
               <a:t>Converting the codebase to java</a:t>
+            </a:r>
+          </a:p>
+          <a:p>
+            <a:pPr marL="342900" indent="-342900" defTabSz="2949575">
+              <a:lnSpc>
+                <a:spcPts val="3200"/>
+              </a:lnSpc>
+              <a:buFont typeface="Arial" panose="020B0604020202020204" pitchFamily="34" charset="0"/>
+              <a:buChar char="•"/>
+              <a:defRPr/>
+            </a:pPr>
+            <a:r>
+              <a:rPr lang="en-GB" sz="2400" dirty="0">
+                <a:latin typeface="Arial" panose="020B0604020202020204" pitchFamily="34" charset="0"/>
+                <a:ea typeface="Calibri" panose="020F0502020204030204" pitchFamily="34" charset="0"/>
+              </a:rPr>
+              <a:t>Execution time: 543 seconds</a:t>
             </a:r>
           </a:p>
           <a:p>
@@ -9318,10 +9335,34 @@
                 <a:latin typeface="Arial" panose="020B0604020202020204" pitchFamily="34" charset="0"/>
                 <a:ea typeface="Calibri" panose="020F0502020204030204" pitchFamily="34" charset="0"/>
               </a:rPr>
-              <a:t>A Count-min sketch is a list that we update for each vector. For each vector, we store the key, position, and value. Each vector list is hashed to create the sketch. Because the actual values are compressed into this w by d matrix, estimating the results is less computationally expensive. A </a:t>
+              <a:t>A Count-min sketch is a list that we update for each vector.</a:t>
             </a:r>
             <a:r>
-              <a:rPr lang="en-US" sz="2400" dirty="0" err="1">
+              <a:rPr lang="en-GB" sz="2400" dirty="0">
+                <a:effectLst/>
+                <a:latin typeface="Arial" panose="020B0604020202020204" pitchFamily="34" charset="0"/>
+                <a:ea typeface="Calibri" panose="020F0502020204030204" pitchFamily="34" charset="0"/>
+              </a:rPr>
+              <a:t> For each vector, we store all values in the CM sketch and hash them based on their position within the vector</a:t>
+            </a:r>
+            <a:r>
+              <a:rPr lang="en-US" sz="2400" dirty="0">
+                <a:effectLst/>
+                <a:latin typeface="Arial" panose="020B0604020202020204" pitchFamily="34" charset="0"/>
+                <a:ea typeface="Calibri" panose="020F0502020204030204" pitchFamily="34" charset="0"/>
+              </a:rPr>
+              <a:t>. Because the actual values are compressed into this w by d matrix, estimating the results is less computationally expensive and requires less storage. </a:t>
+            </a:r>
+            <a:r>
+              <a:rPr lang="en-GB" sz="2400" dirty="0">
+                <a:effectLst/>
+                <a:latin typeface="Arial" panose="020B0604020202020204" pitchFamily="34" charset="0"/>
+                <a:ea typeface="Calibri" panose="020F0502020204030204" pitchFamily="34" charset="0"/>
+              </a:rPr>
+              <a:t>A </a:t>
+            </a:r>
+            <a:r>
+              <a:rPr lang="en-GB" sz="2400" dirty="0" err="1">
                 <a:effectLst/>
                 <a:latin typeface="Arial" panose="020B0604020202020204" pitchFamily="34" charset="0"/>
                 <a:ea typeface="Calibri" panose="020F0502020204030204" pitchFamily="34" charset="0"/>
@@ -9329,12 +9370,19 @@
               <a:t>Hashmap</a:t>
             </a:r>
             <a:r>
-              <a:rPr lang="en-US" sz="2400" dirty="0">
+              <a:rPr lang="en-GB" sz="2400" dirty="0">
                 <a:effectLst/>
                 <a:latin typeface="Arial" panose="020B0604020202020204" pitchFamily="34" charset="0"/>
                 <a:ea typeface="Calibri" panose="020F0502020204030204" pitchFamily="34" charset="0"/>
               </a:rPr>
-              <a:t> is used to match the index of a count-min sketch to the key to the vector. The broadcast function is used to keep a variable cached on each machine which reduces communication costs between nodes. We get the aggregated variance by applying a cartesian and getting the value based on the position for the sketch. A filter function is used to get the triples that are below a certain threshold. </a:t>
+              <a:t> is created to map the ID of a vector to the corresponding count-min sketch. The broadcast function is used to send this variable to all workers from the driver which reduces communication costs between nodes.  The execution time is 82.62 seconds for epsilon </a:t>
+            </a:r>
+            <a:r>
+              <a:rPr lang="en-GB" sz="2400" dirty="0">
+                <a:latin typeface="Arial" panose="020B0604020202020204" pitchFamily="34" charset="0"/>
+                <a:ea typeface="Calibri" panose="020F0502020204030204" pitchFamily="34" charset="0"/>
+              </a:rPr>
+              <a:t>= 0.01, delta = 0.1 and tau = 200000.</a:t>
             </a:r>
             <a:endParaRPr lang="en-GB" sz="2400" dirty="0">
               <a:effectLst/>

</xml_diff>